<commit_message>
Add nanodbc into presentation
</commit_message>
<xml_diff>
--- a/BookingSystem/docs/Presentation.pptx
+++ b/BookingSystem/docs/Presentation.pptx
@@ -3781,7 +3781,7 @@
         </p:blipFill>
         <p:spPr bwMode="auto">
           <a:xfrm>
-            <a:off x="3369605" y="2812321"/>
+            <a:off x="2524127" y="2762273"/>
             <a:ext cx="1294856" cy="1294856"/>
           </a:xfrm>
           <a:prstGeom prst="rect">
@@ -3828,7 +3828,7 @@
         </p:blipFill>
         <p:spPr bwMode="auto">
           <a:xfrm>
-            <a:off x="1004386" y="2701212"/>
+            <a:off x="532830" y="2681913"/>
             <a:ext cx="1294856" cy="1455576"/>
           </a:xfrm>
           <a:prstGeom prst="rect">
@@ -3920,7 +3920,7 @@
         </p:blipFill>
         <p:spPr bwMode="auto">
           <a:xfrm>
-            <a:off x="962060" y="4764029"/>
+            <a:off x="588085" y="4952658"/>
             <a:ext cx="1379508" cy="1379508"/>
           </a:xfrm>
           <a:prstGeom prst="rect">
@@ -3967,7 +3967,7 @@
         </p:blipFill>
         <p:spPr bwMode="auto">
           <a:xfrm>
-            <a:off x="3171555" y="4608304"/>
+            <a:off x="2767551" y="4643013"/>
             <a:ext cx="1690957" cy="1690957"/>
           </a:xfrm>
           <a:prstGeom prst="rect">
@@ -4063,6 +4063,51 @@
           <a:xfrm>
             <a:off x="9141254" y="3581400"/>
             <a:ext cx="2359144" cy="1907092"/>
+          </a:xfrm>
+          <a:prstGeom prst="rect">
+            <a:avLst/>
+          </a:prstGeom>
+          <a:noFill/>
+          <a:extLst>
+            <a:ext uri="{909E8E84-426E-40DD-AFC4-6F175D3DCCD1}">
+              <a14:hiddenFill xmlns:a14="http://schemas.microsoft.com/office/drawing/2010/main">
+                <a:solidFill>
+                  <a:srgbClr val="FFFFFF"/>
+                </a:solidFill>
+              </a14:hiddenFill>
+            </a:ext>
+          </a:extLst>
+        </p:spPr>
+      </p:pic>
+      <p:pic>
+        <p:nvPicPr>
+          <p:cNvPr id="1026" name="Picture 2" descr="nanodbc-banner">
+            <a:extLst>
+              <a:ext uri="{FF2B5EF4-FFF2-40B4-BE49-F238E27FC236}">
+                <a16:creationId xmlns:a16="http://schemas.microsoft.com/office/drawing/2014/main" id="{B0EF381B-F658-452A-A85A-A68E180D5ACE}"/>
+              </a:ext>
+            </a:extLst>
+          </p:cNvPr>
+          <p:cNvPicPr>
+            <a:picLocks noChangeAspect="1" noChangeArrowheads="1"/>
+          </p:cNvPicPr>
+          <p:nvPr/>
+        </p:nvPicPr>
+        <p:blipFill rotWithShape="1">
+          <a:blip r:embed="rId9">
+            <a:extLst>
+              <a:ext uri="{28A0092B-C50C-407E-A947-70E740481C1C}">
+                <a14:useLocalDpi xmlns:a14="http://schemas.microsoft.com/office/drawing/2010/main" val="0"/>
+              </a:ext>
+            </a:extLst>
+          </a:blip>
+          <a:srcRect l="35185" t="25883" r="34461" b="17548"/>
+          <a:stretch/>
+        </p:blipFill>
+        <p:spPr bwMode="auto">
+          <a:xfrm>
+            <a:off x="8182213" y="2762273"/>
+            <a:ext cx="1485660" cy="1455576"/>
           </a:xfrm>
           <a:prstGeom prst="rect">
             <a:avLst/>

</xml_diff>